<commit_message>
Text and link updates to powerpoint.
</commit_message>
<xml_diff>
--- a/Vegas_dot_com assessment Powerpoint.pptx
+++ b/Vegas_dot_com assessment Powerpoint.pptx
@@ -221,7 +221,7 @@
           <a:p>
             <a:fld id="{2B85766F-5EC0-4797-B4D1-777FCB005B11}" type="datetimeFigureOut">
               <a:rPr lang="en-US" smtClean="0"/>
-              <a:t>2/19/2023</a:t>
+              <a:t>2/20/2023</a:t>
             </a:fld>
             <a:endParaRPr lang="en-US" dirty="0"/>
           </a:p>
@@ -398,7 +398,7 @@
           <a:p>
             <a:fld id="{B2B4B5EC-152C-4627-80C0-63B10D5574EF}" type="datetimeFigureOut">
               <a:rPr lang="en-US" smtClean="0"/>
-              <a:t>2/19/2023</a:t>
+              <a:t>2/20/2023</a:t>
             </a:fld>
             <a:endParaRPr lang="en-US" dirty="0"/>
           </a:p>
@@ -4947,7 +4947,7 @@
           <a:p>
             <a:fld id="{48A87A34-81AB-432B-8DAE-1953F412C126}" type="datetimeFigureOut">
               <a:rPr lang="en-US" smtClean="0"/>
-              <a:t>2/19/2023</a:t>
+              <a:t>2/20/2023</a:t>
             </a:fld>
             <a:endParaRPr lang="en-US" dirty="0"/>
           </a:p>
@@ -5214,7 +5214,7 @@
           <a:p>
             <a:fld id="{48A87A34-81AB-432B-8DAE-1953F412C126}" type="datetimeFigureOut">
               <a:rPr lang="en-US" smtClean="0"/>
-              <a:t>2/19/2023</a:t>
+              <a:t>2/20/2023</a:t>
             </a:fld>
             <a:endParaRPr lang="en-US" dirty="0"/>
           </a:p>
@@ -5410,7 +5410,7 @@
           <a:p>
             <a:fld id="{48A87A34-81AB-432B-8DAE-1953F412C126}" type="datetimeFigureOut">
               <a:rPr lang="en-US" smtClean="0"/>
-              <a:t>2/19/2023</a:t>
+              <a:t>2/20/2023</a:t>
             </a:fld>
             <a:endParaRPr lang="en-US" dirty="0"/>
           </a:p>
@@ -5673,7 +5673,7 @@
           <a:p>
             <a:fld id="{48A87A34-81AB-432B-8DAE-1953F412C126}" type="datetimeFigureOut">
               <a:rPr lang="en-US" smtClean="0"/>
-              <a:t>2/19/2023</a:t>
+              <a:t>2/20/2023</a:t>
             </a:fld>
             <a:endParaRPr lang="en-US" dirty="0"/>
           </a:p>
@@ -6107,7 +6107,7 @@
           <a:p>
             <a:fld id="{48A87A34-81AB-432B-8DAE-1953F412C126}" type="datetimeFigureOut">
               <a:rPr lang="en-US" smtClean="0"/>
-              <a:t>2/19/2023</a:t>
+              <a:t>2/20/2023</a:t>
             </a:fld>
             <a:endParaRPr lang="en-US" dirty="0"/>
           </a:p>
@@ -6653,7 +6653,7 @@
           <a:p>
             <a:fld id="{48A87A34-81AB-432B-8DAE-1953F412C126}" type="datetimeFigureOut">
               <a:rPr lang="en-US" smtClean="0"/>
-              <a:t>2/19/2023</a:t>
+              <a:t>2/20/2023</a:t>
             </a:fld>
             <a:endParaRPr lang="en-US" dirty="0"/>
           </a:p>
@@ -7373,7 +7373,7 @@
           <a:p>
             <a:fld id="{48A87A34-81AB-432B-8DAE-1953F412C126}" type="datetimeFigureOut">
               <a:rPr lang="en-US" smtClean="0"/>
-              <a:t>2/19/2023</a:t>
+              <a:t>2/20/2023</a:t>
             </a:fld>
             <a:endParaRPr lang="en-US" dirty="0"/>
           </a:p>
@@ -7543,7 +7543,7 @@
           <a:p>
             <a:fld id="{48A87A34-81AB-432B-8DAE-1953F412C126}" type="datetimeFigureOut">
               <a:rPr lang="en-US" smtClean="0"/>
-              <a:t>2/19/2023</a:t>
+              <a:t>2/20/2023</a:t>
             </a:fld>
             <a:endParaRPr lang="en-US" dirty="0"/>
           </a:p>
@@ -7723,7 +7723,7 @@
           <a:p>
             <a:fld id="{48A87A34-81AB-432B-8DAE-1953F412C126}" type="datetimeFigureOut">
               <a:rPr lang="en-US" smtClean="0"/>
-              <a:t>2/19/2023</a:t>
+              <a:t>2/20/2023</a:t>
             </a:fld>
             <a:endParaRPr lang="en-US" dirty="0"/>
           </a:p>
@@ -7893,7 +7893,7 @@
           <a:p>
             <a:fld id="{48A87A34-81AB-432B-8DAE-1953F412C126}" type="datetimeFigureOut">
               <a:rPr lang="en-US" smtClean="0"/>
-              <a:t>2/19/2023</a:t>
+              <a:t>2/20/2023</a:t>
             </a:fld>
             <a:endParaRPr lang="en-US" dirty="0"/>
           </a:p>
@@ -8143,7 +8143,7 @@
           <a:p>
             <a:fld id="{48A87A34-81AB-432B-8DAE-1953F412C126}" type="datetimeFigureOut">
               <a:rPr lang="en-US" smtClean="0"/>
-              <a:t>2/19/2023</a:t>
+              <a:t>2/20/2023</a:t>
             </a:fld>
             <a:endParaRPr lang="en-US" dirty="0"/>
           </a:p>
@@ -8375,7 +8375,7 @@
           <a:p>
             <a:fld id="{48A87A34-81AB-432B-8DAE-1953F412C126}" type="datetimeFigureOut">
               <a:rPr lang="en-US" smtClean="0"/>
-              <a:t>2/19/2023</a:t>
+              <a:t>2/20/2023</a:t>
             </a:fld>
             <a:endParaRPr lang="en-US" dirty="0"/>
           </a:p>
@@ -8756,7 +8756,7 @@
           <a:p>
             <a:fld id="{48A87A34-81AB-432B-8DAE-1953F412C126}" type="datetimeFigureOut">
               <a:rPr lang="en-US" smtClean="0"/>
-              <a:t>2/19/2023</a:t>
+              <a:t>2/20/2023</a:t>
             </a:fld>
             <a:endParaRPr lang="en-US" dirty="0"/>
           </a:p>
@@ -8874,7 +8874,7 @@
           <a:p>
             <a:fld id="{48A87A34-81AB-432B-8DAE-1953F412C126}" type="datetimeFigureOut">
               <a:rPr lang="en-US" smtClean="0"/>
-              <a:t>2/19/2023</a:t>
+              <a:t>2/20/2023</a:t>
             </a:fld>
             <a:endParaRPr lang="en-US" dirty="0"/>
           </a:p>
@@ -8969,7 +8969,7 @@
           <a:p>
             <a:fld id="{48A87A34-81AB-432B-8DAE-1953F412C126}" type="datetimeFigureOut">
               <a:rPr lang="en-US" smtClean="0"/>
-              <a:t>2/19/2023</a:t>
+              <a:t>2/20/2023</a:t>
             </a:fld>
             <a:endParaRPr lang="en-US" dirty="0"/>
           </a:p>
@@ -9218,7 +9218,7 @@
           <a:p>
             <a:fld id="{48A87A34-81AB-432B-8DAE-1953F412C126}" type="datetimeFigureOut">
               <a:rPr lang="en-US" smtClean="0"/>
-              <a:t>2/19/2023</a:t>
+              <a:t>2/20/2023</a:t>
             </a:fld>
             <a:endParaRPr lang="en-US" dirty="0"/>
           </a:p>
@@ -9498,7 +9498,7 @@
           <a:p>
             <a:fld id="{48A87A34-81AB-432B-8DAE-1953F412C126}" type="datetimeFigureOut">
               <a:rPr lang="en-US" smtClean="0"/>
-              <a:t>2/19/2023</a:t>
+              <a:t>2/20/2023</a:t>
             </a:fld>
             <a:endParaRPr lang="en-US" dirty="0"/>
           </a:p>
@@ -12566,7 +12566,7 @@
             <a:fld id="{48A87A34-81AB-432B-8DAE-1953F412C126}" type="datetimeFigureOut">
               <a:rPr lang="en-US" smtClean="0"/>
               <a:pPr/>
-              <a:t>2/19/2023</a:t>
+              <a:t>2/20/2023</a:t>
             </a:fld>
             <a:endParaRPr lang="en-US" dirty="0"/>
           </a:p>
@@ -13039,7 +13039,7 @@
         <p:spPr/>
         <p:txBody>
           <a:bodyPr>
-            <a:normAutofit/>
+            <a:normAutofit fontScale="85000" lnSpcReduction="10000"/>
           </a:bodyPr>
           <a:lstStyle/>
           <a:p>
@@ -13050,15 +13050,27 @@
                 <a:ea typeface="Tahoma" panose="020B0604030504040204" pitchFamily="34" charset="0"/>
                 <a:cs typeface="Tahoma" panose="020B0604030504040204" pitchFamily="34" charset="0"/>
               </a:rPr>
-              <a:t>By </a:t>
+              <a:t>By Gavin Gunawardena</a:t>
             </a:r>
+          </a:p>
+          <a:p>
+            <a:pPr algn="ctr"/>
             <a:r>
-              <a:rPr lang="en-US" sz="2400">
+              <a:rPr lang="en-US" sz="2400" dirty="0">
                 <a:latin typeface="Tahoma" panose="020B0604030504040204" pitchFamily="34" charset="0"/>
                 <a:ea typeface="Tahoma" panose="020B0604030504040204" pitchFamily="34" charset="0"/>
                 <a:cs typeface="Tahoma" panose="020B0604030504040204" pitchFamily="34" charset="0"/>
               </a:rPr>
-              <a:t>Gavin Gunawardena</a:t>
+              <a:t>Code: </a:t>
+            </a:r>
+            <a:r>
+              <a:rPr lang="en-US" sz="2400" dirty="0">
+                <a:latin typeface="Tahoma" panose="020B0604030504040204" pitchFamily="34" charset="0"/>
+                <a:ea typeface="Tahoma" panose="020B0604030504040204" pitchFamily="34" charset="0"/>
+                <a:cs typeface="Tahoma" panose="020B0604030504040204" pitchFamily="34" charset="0"/>
+                <a:hlinkClick r:id="rId2"/>
+              </a:rPr>
+              <a:t>https://nbviewer.org/github/ggunaward/Misc/blob/main/Vegas.com%20Assessment%20Code%20Gavin%20Gunawardena.ipynb</a:t>
             </a:r>
             <a:endParaRPr lang="en-US" sz="2400" dirty="0">
               <a:latin typeface="Tahoma" panose="020B0604030504040204" pitchFamily="34" charset="0"/>
@@ -13156,7 +13168,7 @@
             <a:pPr lvl="1"/>
             <a:r>
               <a:rPr lang="en-US" dirty="0"/>
-              <a:t>Look for interesting insights in the employee data</a:t>
+              <a:t>Look for insights in the employee data</a:t>
             </a:r>
           </a:p>
           <a:p>
@@ -13333,7 +13345,7 @@
             <a:pPr lvl="2"/>
             <a:r>
               <a:rPr lang="en-US" dirty="0"/>
-              <a:t>Linear min-max scaling was used, utilizing the minimum and maximum value of each numeric variable to set their values between 0 and 1.</a:t>
+              <a:t>Min-max scaling was used, utilizing the minimum and maximum value of each numeric variable to set their values between 0 and 1.</a:t>
             </a:r>
           </a:p>
           <a:p>
@@ -13367,14 +13379,14 @@
             <a:pPr lvl="2"/>
             <a:r>
               <a:rPr lang="en-US" dirty="0"/>
-              <a:t>Chosen as it is commonly  used  in many industries due to being simple and not a black box (easy to showcase inner workings)</a:t>
+              <a:t>Chosen as it is commonly  used  in many industries due to being simple and not a black box (it’s easy to showcase inner workings)</a:t>
             </a:r>
           </a:p>
           <a:p>
             <a:pPr lvl="2"/>
             <a:r>
               <a:rPr lang="en-US" dirty="0"/>
-              <a:t>Combats common issues in datasets like multicollinearity, target variables being correlated with each other, but more importantly narrows down variables to those with the strongest correlations to the target variables</a:t>
+              <a:t>Combats common issues in datasets like multicollinearity (target variables being correlated with each other), but more importantly helps narrow down variables to those with the strongest correlations to the target variables</a:t>
             </a:r>
           </a:p>
           <a:p>
@@ -13509,7 +13521,7 @@
             </a:pPr>
             <a:r>
               <a:rPr lang="en-US" dirty="0"/>
-              <a:t>Job satisfaction data does not have strong correlations with any of the numeric variables</a:t>
+              <a:t>“Job satisfaction” data does not have strong correlations with any of the numeric variables</a:t>
             </a:r>
           </a:p>
           <a:p>
@@ -13667,7 +13679,7 @@
             </a:pPr>
             <a:r>
               <a:rPr lang="en-US" dirty="0"/>
-              <a:t>“Years at company” has strong correlations with other numeric variables, but also a lot more noise</a:t>
+              <a:t>“Years at Company” has strong correlations with other numeric variables, but also a lot more noise</a:t>
             </a:r>
           </a:p>
           <a:p>
@@ -14022,7 +14034,7 @@
           <a:p>
             <a:r>
               <a:rPr lang="en-US" dirty="0"/>
-              <a:t>The largest improvements to turnover for the company can be made by:</a:t>
+              <a:t>Improvements can be made to turnover rates for the company by:</a:t>
             </a:r>
           </a:p>
           <a:p>

</xml_diff>

<commit_message>
Added date to title page of powerpoint
</commit_message>
<xml_diff>
--- a/Vegas_dot_com assessment Powerpoint.pptx
+++ b/Vegas_dot_com assessment Powerpoint.pptx
@@ -722,7 +722,7 @@
           <a:noFill/>
           <a:extLst>
             <a:ext uri="{909E8E84-426E-40dd-AFC4-6F175D3DCCD1}">
-              <a14:hiddenFill xmlns="" xmlns:a14="http://schemas.microsoft.com/office/drawing/2010/main">
+              <a14:hiddenFill xmlns:a14="http://schemas.microsoft.com/office/drawing/2010/main" xmlns="">
                 <a:solidFill>
                   <a:srgbClr val="FFFFFF"/>
                 </a:solidFill>
@@ -781,7 +781,7 @@
             </a:ln>
             <a:extLst>
               <a:ext uri="{91240B29-F687-4f45-9708-019B960494DF}">
-                <a14:hiddenLine xmlns="" xmlns:a14="http://schemas.microsoft.com/office/drawing/2010/main" w="9525">
+                <a14:hiddenLine xmlns:a14="http://schemas.microsoft.com/office/drawing/2010/main" xmlns="" w="9525">
                   <a:solidFill>
                     <a:srgbClr val="000000"/>
                   </a:solidFill>
@@ -871,7 +871,7 @@
             </a:ln>
             <a:extLst>
               <a:ext uri="{91240B29-F687-4f45-9708-019B960494DF}">
-                <a14:hiddenLine xmlns="" xmlns:a14="http://schemas.microsoft.com/office/drawing/2010/main" w="9525">
+                <a14:hiddenLine xmlns:a14="http://schemas.microsoft.com/office/drawing/2010/main" xmlns="" w="9525">
                   <a:solidFill>
                     <a:srgbClr val="000000"/>
                   </a:solidFill>
@@ -961,7 +961,7 @@
             </a:ln>
             <a:extLst>
               <a:ext uri="{91240B29-F687-4f45-9708-019B960494DF}">
-                <a14:hiddenLine xmlns="" xmlns:a14="http://schemas.microsoft.com/office/drawing/2010/main" w="9525">
+                <a14:hiddenLine xmlns:a14="http://schemas.microsoft.com/office/drawing/2010/main" xmlns="" w="9525">
                   <a:solidFill>
                     <a:srgbClr val="000000"/>
                   </a:solidFill>
@@ -995,7 +995,7 @@
             </a:ln>
             <a:extLst>
               <a:ext uri="{91240B29-F687-4f45-9708-019B960494DF}">
-                <a14:hiddenLine xmlns="" xmlns:a14="http://schemas.microsoft.com/office/drawing/2010/main" w="9525">
+                <a14:hiddenLine xmlns:a14="http://schemas.microsoft.com/office/drawing/2010/main" xmlns="" w="9525">
                   <a:solidFill>
                     <a:srgbClr val="000000"/>
                   </a:solidFill>
@@ -1085,7 +1085,7 @@
             </a:ln>
             <a:extLst>
               <a:ext uri="{91240B29-F687-4f45-9708-019B960494DF}">
-                <a14:hiddenLine xmlns="" xmlns:a14="http://schemas.microsoft.com/office/drawing/2010/main" w="9525">
+                <a14:hiddenLine xmlns:a14="http://schemas.microsoft.com/office/drawing/2010/main" xmlns="" w="9525">
                   <a:solidFill>
                     <a:srgbClr val="000000"/>
                   </a:solidFill>
@@ -1147,7 +1147,7 @@
             </a:ln>
             <a:extLst>
               <a:ext uri="{91240B29-F687-4f45-9708-019B960494DF}">
-                <a14:hiddenLine xmlns="" xmlns:a14="http://schemas.microsoft.com/office/drawing/2010/main" w="9525">
+                <a14:hiddenLine xmlns:a14="http://schemas.microsoft.com/office/drawing/2010/main" xmlns="" w="9525">
                   <a:solidFill>
                     <a:srgbClr val="000000"/>
                   </a:solidFill>
@@ -1209,7 +1209,7 @@
             </a:ln>
             <a:extLst>
               <a:ext uri="{91240B29-F687-4f45-9708-019B960494DF}">
-                <a14:hiddenLine xmlns="" xmlns:a14="http://schemas.microsoft.com/office/drawing/2010/main" w="9525">
+                <a14:hiddenLine xmlns:a14="http://schemas.microsoft.com/office/drawing/2010/main" xmlns="" w="9525">
                   <a:solidFill>
                     <a:srgbClr val="000000"/>
                   </a:solidFill>
@@ -1299,7 +1299,7 @@
             </a:ln>
             <a:extLst>
               <a:ext uri="{91240B29-F687-4f45-9708-019B960494DF}">
-                <a14:hiddenLine xmlns="" xmlns:a14="http://schemas.microsoft.com/office/drawing/2010/main" w="9525">
+                <a14:hiddenLine xmlns:a14="http://schemas.microsoft.com/office/drawing/2010/main" xmlns="" w="9525">
                   <a:solidFill>
                     <a:srgbClr val="000000"/>
                   </a:solidFill>
@@ -1361,7 +1361,7 @@
             </a:ln>
             <a:extLst>
               <a:ext uri="{91240B29-F687-4f45-9708-019B960494DF}">
-                <a14:hiddenLine xmlns="" xmlns:a14="http://schemas.microsoft.com/office/drawing/2010/main" w="9525">
+                <a14:hiddenLine xmlns:a14="http://schemas.microsoft.com/office/drawing/2010/main" xmlns="" w="9525">
                   <a:solidFill>
                     <a:srgbClr val="000000"/>
                   </a:solidFill>
@@ -1423,7 +1423,7 @@
             </a:ln>
             <a:extLst>
               <a:ext uri="{91240B29-F687-4f45-9708-019B960494DF}">
-                <a14:hiddenLine xmlns="" xmlns:a14="http://schemas.microsoft.com/office/drawing/2010/main" w="9525">
+                <a14:hiddenLine xmlns:a14="http://schemas.microsoft.com/office/drawing/2010/main" xmlns="" w="9525">
                   <a:solidFill>
                     <a:srgbClr val="000000"/>
                   </a:solidFill>
@@ -1513,7 +1513,7 @@
             </a:ln>
             <a:extLst>
               <a:ext uri="{91240B29-F687-4f45-9708-019B960494DF}">
-                <a14:hiddenLine xmlns="" xmlns:a14="http://schemas.microsoft.com/office/drawing/2010/main" w="9525">
+                <a14:hiddenLine xmlns:a14="http://schemas.microsoft.com/office/drawing/2010/main" xmlns="" w="9525">
                   <a:solidFill>
                     <a:srgbClr val="000000"/>
                   </a:solidFill>
@@ -1603,7 +1603,7 @@
             </a:ln>
             <a:extLst>
               <a:ext uri="{91240B29-F687-4f45-9708-019B960494DF}">
-                <a14:hiddenLine xmlns="" xmlns:a14="http://schemas.microsoft.com/office/drawing/2010/main" w="9525">
+                <a14:hiddenLine xmlns:a14="http://schemas.microsoft.com/office/drawing/2010/main" xmlns="" w="9525">
                   <a:solidFill>
                     <a:srgbClr val="000000"/>
                   </a:solidFill>
@@ -1665,7 +1665,7 @@
             </a:ln>
             <a:extLst>
               <a:ext uri="{91240B29-F687-4f45-9708-019B960494DF}">
-                <a14:hiddenLine xmlns="" xmlns:a14="http://schemas.microsoft.com/office/drawing/2010/main" w="9525">
+                <a14:hiddenLine xmlns:a14="http://schemas.microsoft.com/office/drawing/2010/main" xmlns="" w="9525">
                   <a:solidFill>
                     <a:srgbClr val="000000"/>
                   </a:solidFill>
@@ -1775,7 +1775,7 @@
             </a:ln>
             <a:extLst>
               <a:ext uri="{91240B29-F687-4f45-9708-019B960494DF}">
-                <a14:hiddenLine xmlns="" xmlns:a14="http://schemas.microsoft.com/office/drawing/2010/main" w="9525">
+                <a14:hiddenLine xmlns:a14="http://schemas.microsoft.com/office/drawing/2010/main" xmlns="" w="9525">
                   <a:solidFill>
                     <a:srgbClr val="000000"/>
                   </a:solidFill>
@@ -1837,7 +1837,7 @@
             </a:ln>
             <a:extLst>
               <a:ext uri="{91240B29-F687-4f45-9708-019B960494DF}">
-                <a14:hiddenLine xmlns="" xmlns:a14="http://schemas.microsoft.com/office/drawing/2010/main" w="9525">
+                <a14:hiddenLine xmlns:a14="http://schemas.microsoft.com/office/drawing/2010/main" xmlns="" w="9525">
                   <a:solidFill>
                     <a:srgbClr val="000000"/>
                   </a:solidFill>
@@ -1927,7 +1927,7 @@
             </a:ln>
             <a:extLst>
               <a:ext uri="{91240B29-F687-4f45-9708-019B960494DF}">
-                <a14:hiddenLine xmlns="" xmlns:a14="http://schemas.microsoft.com/office/drawing/2010/main" w="9525">
+                <a14:hiddenLine xmlns:a14="http://schemas.microsoft.com/office/drawing/2010/main" xmlns="" w="9525">
                   <a:solidFill>
                     <a:srgbClr val="000000"/>
                   </a:solidFill>
@@ -2017,7 +2017,7 @@
             </a:ln>
             <a:extLst>
               <a:ext uri="{91240B29-F687-4f45-9708-019B960494DF}">
-                <a14:hiddenLine xmlns="" xmlns:a14="http://schemas.microsoft.com/office/drawing/2010/main" w="9525">
+                <a14:hiddenLine xmlns:a14="http://schemas.microsoft.com/office/drawing/2010/main" xmlns="" w="9525">
                   <a:solidFill>
                     <a:srgbClr val="000000"/>
                   </a:solidFill>
@@ -2079,7 +2079,7 @@
             </a:ln>
             <a:extLst>
               <a:ext uri="{91240B29-F687-4f45-9708-019B960494DF}">
-                <a14:hiddenLine xmlns="" xmlns:a14="http://schemas.microsoft.com/office/drawing/2010/main" w="9525">
+                <a14:hiddenLine xmlns:a14="http://schemas.microsoft.com/office/drawing/2010/main" xmlns="" w="9525">
                   <a:solidFill>
                     <a:srgbClr val="000000"/>
                   </a:solidFill>
@@ -2169,7 +2169,7 @@
             </a:ln>
             <a:extLst>
               <a:ext uri="{91240B29-F687-4f45-9708-019B960494DF}">
-                <a14:hiddenLine xmlns="" xmlns:a14="http://schemas.microsoft.com/office/drawing/2010/main" w="9525">
+                <a14:hiddenLine xmlns:a14="http://schemas.microsoft.com/office/drawing/2010/main" xmlns="" w="9525">
                   <a:solidFill>
                     <a:srgbClr val="000000"/>
                   </a:solidFill>
@@ -2259,7 +2259,7 @@
             </a:ln>
             <a:extLst>
               <a:ext uri="{91240B29-F687-4f45-9708-019B960494DF}">
-                <a14:hiddenLine xmlns="" xmlns:a14="http://schemas.microsoft.com/office/drawing/2010/main" w="9525">
+                <a14:hiddenLine xmlns:a14="http://schemas.microsoft.com/office/drawing/2010/main" xmlns="" w="9525">
                   <a:solidFill>
                     <a:srgbClr val="000000"/>
                   </a:solidFill>
@@ -2315,7 +2315,7 @@
             </a:ln>
             <a:extLst>
               <a:ext uri="{91240B29-F687-4f45-9708-019B960494DF}">
-                <a14:hiddenLine xmlns="" xmlns:a14="http://schemas.microsoft.com/office/drawing/2010/main" w="9525">
+                <a14:hiddenLine xmlns:a14="http://schemas.microsoft.com/office/drawing/2010/main" xmlns="" w="9525">
                   <a:solidFill>
                     <a:srgbClr val="000000"/>
                   </a:solidFill>
@@ -2405,7 +2405,7 @@
             </a:ln>
             <a:extLst>
               <a:ext uri="{91240B29-F687-4f45-9708-019B960494DF}">
-                <a14:hiddenLine xmlns="" xmlns:a14="http://schemas.microsoft.com/office/drawing/2010/main" w="9525">
+                <a14:hiddenLine xmlns:a14="http://schemas.microsoft.com/office/drawing/2010/main" xmlns="" w="9525">
                   <a:solidFill>
                     <a:srgbClr val="000000"/>
                   </a:solidFill>
@@ -2461,7 +2461,7 @@
             </a:ln>
             <a:extLst>
               <a:ext uri="{91240B29-F687-4f45-9708-019B960494DF}">
-                <a14:hiddenLine xmlns="" xmlns:a14="http://schemas.microsoft.com/office/drawing/2010/main" w="9525">
+                <a14:hiddenLine xmlns:a14="http://schemas.microsoft.com/office/drawing/2010/main" xmlns="" w="9525">
                   <a:solidFill>
                     <a:srgbClr val="000000"/>
                   </a:solidFill>
@@ -2551,7 +2551,7 @@
             </a:ln>
             <a:extLst>
               <a:ext uri="{91240B29-F687-4f45-9708-019B960494DF}">
-                <a14:hiddenLine xmlns="" xmlns:a14="http://schemas.microsoft.com/office/drawing/2010/main" w="9525">
+                <a14:hiddenLine xmlns:a14="http://schemas.microsoft.com/office/drawing/2010/main" xmlns="" w="9525">
                   <a:solidFill>
                     <a:srgbClr val="000000"/>
                   </a:solidFill>
@@ -2619,7 +2619,7 @@
             </a:ln>
             <a:extLst>
               <a:ext uri="{91240B29-F687-4f45-9708-019B960494DF}">
-                <a14:hiddenLine xmlns="" xmlns:a14="http://schemas.microsoft.com/office/drawing/2010/main" w="9525">
+                <a14:hiddenLine xmlns:a14="http://schemas.microsoft.com/office/drawing/2010/main" xmlns="" w="9525">
                   <a:solidFill>
                     <a:srgbClr val="000000"/>
                   </a:solidFill>
@@ -2709,7 +2709,7 @@
             </a:ln>
             <a:extLst>
               <a:ext uri="{91240B29-F687-4f45-9708-019B960494DF}">
-                <a14:hiddenLine xmlns="" xmlns:a14="http://schemas.microsoft.com/office/drawing/2010/main" w="9525">
+                <a14:hiddenLine xmlns:a14="http://schemas.microsoft.com/office/drawing/2010/main" xmlns="" w="9525">
                   <a:solidFill>
                     <a:srgbClr val="000000"/>
                   </a:solidFill>
@@ -2777,7 +2777,7 @@
             </a:ln>
             <a:extLst>
               <a:ext uri="{91240B29-F687-4f45-9708-019B960494DF}">
-                <a14:hiddenLine xmlns="" xmlns:a14="http://schemas.microsoft.com/office/drawing/2010/main" w="9525">
+                <a14:hiddenLine xmlns:a14="http://schemas.microsoft.com/office/drawing/2010/main" xmlns="" w="9525">
                   <a:solidFill>
                     <a:srgbClr val="000000"/>
                   </a:solidFill>
@@ -2867,7 +2867,7 @@
             </a:ln>
             <a:extLst>
               <a:ext uri="{91240B29-F687-4f45-9708-019B960494DF}">
-                <a14:hiddenLine xmlns="" xmlns:a14="http://schemas.microsoft.com/office/drawing/2010/main" w="9525">
+                <a14:hiddenLine xmlns:a14="http://schemas.microsoft.com/office/drawing/2010/main" xmlns="" w="9525">
                   <a:solidFill>
                     <a:srgbClr val="000000"/>
                   </a:solidFill>
@@ -2901,7 +2901,7 @@
             </a:ln>
             <a:extLst>
               <a:ext uri="{91240B29-F687-4f45-9708-019B960494DF}">
-                <a14:hiddenLine xmlns="" xmlns:a14="http://schemas.microsoft.com/office/drawing/2010/main" w="9525">
+                <a14:hiddenLine xmlns:a14="http://schemas.microsoft.com/office/drawing/2010/main" xmlns="" w="9525">
                   <a:solidFill>
                     <a:srgbClr val="000000"/>
                   </a:solidFill>
@@ -2991,7 +2991,7 @@
             </a:ln>
             <a:extLst>
               <a:ext uri="{91240B29-F687-4f45-9708-019B960494DF}">
-                <a14:hiddenLine xmlns="" xmlns:a14="http://schemas.microsoft.com/office/drawing/2010/main" w="9525">
+                <a14:hiddenLine xmlns:a14="http://schemas.microsoft.com/office/drawing/2010/main" xmlns="" w="9525">
                   <a:solidFill>
                     <a:srgbClr val="000000"/>
                   </a:solidFill>
@@ -3053,7 +3053,7 @@
             </a:ln>
             <a:extLst>
               <a:ext uri="{91240B29-F687-4f45-9708-019B960494DF}">
-                <a14:hiddenLine xmlns="" xmlns:a14="http://schemas.microsoft.com/office/drawing/2010/main" w="9525">
+                <a14:hiddenLine xmlns:a14="http://schemas.microsoft.com/office/drawing/2010/main" xmlns="" w="9525">
                   <a:solidFill>
                     <a:srgbClr val="000000"/>
                   </a:solidFill>
@@ -3115,7 +3115,7 @@
             </a:ln>
             <a:extLst>
               <a:ext uri="{91240B29-F687-4f45-9708-019B960494DF}">
-                <a14:hiddenLine xmlns="" xmlns:a14="http://schemas.microsoft.com/office/drawing/2010/main" w="9525">
+                <a14:hiddenLine xmlns:a14="http://schemas.microsoft.com/office/drawing/2010/main" xmlns="" w="9525">
                   <a:solidFill>
                     <a:srgbClr val="000000"/>
                   </a:solidFill>
@@ -3205,7 +3205,7 @@
             </a:ln>
             <a:extLst>
               <a:ext uri="{91240B29-F687-4f45-9708-019B960494DF}">
-                <a14:hiddenLine xmlns="" xmlns:a14="http://schemas.microsoft.com/office/drawing/2010/main" w="9525">
+                <a14:hiddenLine xmlns:a14="http://schemas.microsoft.com/office/drawing/2010/main" xmlns="" w="9525">
                   <a:solidFill>
                     <a:srgbClr val="000000"/>
                   </a:solidFill>
@@ -3273,7 +3273,7 @@
             </a:ln>
             <a:extLst>
               <a:ext uri="{91240B29-F687-4f45-9708-019B960494DF}">
-                <a14:hiddenLine xmlns="" xmlns:a14="http://schemas.microsoft.com/office/drawing/2010/main" w="9525">
+                <a14:hiddenLine xmlns:a14="http://schemas.microsoft.com/office/drawing/2010/main" xmlns="" w="9525">
                   <a:solidFill>
                     <a:srgbClr val="000000"/>
                   </a:solidFill>
@@ -3335,7 +3335,7 @@
             </a:ln>
             <a:extLst>
               <a:ext uri="{91240B29-F687-4f45-9708-019B960494DF}">
-                <a14:hiddenLine xmlns="" xmlns:a14="http://schemas.microsoft.com/office/drawing/2010/main" w="9525">
+                <a14:hiddenLine xmlns:a14="http://schemas.microsoft.com/office/drawing/2010/main" xmlns="" w="9525">
                   <a:solidFill>
                     <a:srgbClr val="000000"/>
                   </a:solidFill>
@@ -3425,7 +3425,7 @@
             </a:ln>
             <a:extLst>
               <a:ext uri="{91240B29-F687-4f45-9708-019B960494DF}">
-                <a14:hiddenLine xmlns="" xmlns:a14="http://schemas.microsoft.com/office/drawing/2010/main" w="9525">
+                <a14:hiddenLine xmlns:a14="http://schemas.microsoft.com/office/drawing/2010/main" xmlns="" w="9525">
                   <a:solidFill>
                     <a:srgbClr val="000000"/>
                   </a:solidFill>
@@ -3487,7 +3487,7 @@
             </a:ln>
             <a:extLst>
               <a:ext uri="{91240B29-F687-4f45-9708-019B960494DF}">
-                <a14:hiddenLine xmlns="" xmlns:a14="http://schemas.microsoft.com/office/drawing/2010/main" w="9525">
+                <a14:hiddenLine xmlns:a14="http://schemas.microsoft.com/office/drawing/2010/main" xmlns="" w="9525">
                   <a:solidFill>
                     <a:srgbClr val="000000"/>
                   </a:solidFill>
@@ -3577,7 +3577,7 @@
             </a:ln>
             <a:extLst>
               <a:ext uri="{91240B29-F687-4f45-9708-019B960494DF}">
-                <a14:hiddenLine xmlns="" xmlns:a14="http://schemas.microsoft.com/office/drawing/2010/main" w="9525">
+                <a14:hiddenLine xmlns:a14="http://schemas.microsoft.com/office/drawing/2010/main" xmlns="" w="9525">
                   <a:solidFill>
                     <a:srgbClr val="000000"/>
                   </a:solidFill>
@@ -3639,7 +3639,7 @@
             </a:ln>
             <a:extLst>
               <a:ext uri="{91240B29-F687-4f45-9708-019B960494DF}">
-                <a14:hiddenLine xmlns="" xmlns:a14="http://schemas.microsoft.com/office/drawing/2010/main" w="9525">
+                <a14:hiddenLine xmlns:a14="http://schemas.microsoft.com/office/drawing/2010/main" xmlns="" w="9525">
                   <a:solidFill>
                     <a:srgbClr val="000000"/>
                   </a:solidFill>
@@ -3729,7 +3729,7 @@
             </a:ln>
             <a:extLst>
               <a:ext uri="{91240B29-F687-4f45-9708-019B960494DF}">
-                <a14:hiddenLine xmlns="" xmlns:a14="http://schemas.microsoft.com/office/drawing/2010/main" w="9525">
+                <a14:hiddenLine xmlns:a14="http://schemas.microsoft.com/office/drawing/2010/main" xmlns="" w="9525">
                   <a:solidFill>
                     <a:srgbClr val="000000"/>
                   </a:solidFill>
@@ -3763,7 +3763,7 @@
             </a:ln>
             <a:extLst>
               <a:ext uri="{91240B29-F687-4f45-9708-019B960494DF}">
-                <a14:hiddenLine xmlns="" xmlns:a14="http://schemas.microsoft.com/office/drawing/2010/main" w="9525">
+                <a14:hiddenLine xmlns:a14="http://schemas.microsoft.com/office/drawing/2010/main" xmlns="" w="9525">
                   <a:solidFill>
                     <a:srgbClr val="000000"/>
                   </a:solidFill>
@@ -3828,7 +3828,7 @@
             </a:ln>
             <a:extLst>
               <a:ext uri="{91240B29-F687-4f45-9708-019B960494DF}">
-                <a14:hiddenLine xmlns="" xmlns:a14="http://schemas.microsoft.com/office/drawing/2010/main" w="9525">
+                <a14:hiddenLine xmlns:a14="http://schemas.microsoft.com/office/drawing/2010/main" xmlns="" w="9525">
                   <a:solidFill>
                     <a:srgbClr val="000000"/>
                   </a:solidFill>
@@ -3918,7 +3918,7 @@
             </a:ln>
             <a:extLst>
               <a:ext uri="{91240B29-F687-4f45-9708-019B960494DF}">
-                <a14:hiddenLine xmlns="" xmlns:a14="http://schemas.microsoft.com/office/drawing/2010/main" w="9525">
+                <a14:hiddenLine xmlns:a14="http://schemas.microsoft.com/office/drawing/2010/main" xmlns="" w="9525">
                   <a:solidFill>
                     <a:srgbClr val="000000"/>
                   </a:solidFill>
@@ -3980,7 +3980,7 @@
             </a:ln>
             <a:extLst>
               <a:ext uri="{91240B29-F687-4f45-9708-019B960494DF}">
-                <a14:hiddenLine xmlns="" xmlns:a14="http://schemas.microsoft.com/office/drawing/2010/main" w="9525">
+                <a14:hiddenLine xmlns:a14="http://schemas.microsoft.com/office/drawing/2010/main" xmlns="" w="9525">
                   <a:solidFill>
                     <a:srgbClr val="000000"/>
                   </a:solidFill>
@@ -4070,7 +4070,7 @@
             </a:ln>
             <a:extLst>
               <a:ext uri="{91240B29-F687-4f45-9708-019B960494DF}">
-                <a14:hiddenLine xmlns="" xmlns:a14="http://schemas.microsoft.com/office/drawing/2010/main" w="9525">
+                <a14:hiddenLine xmlns:a14="http://schemas.microsoft.com/office/drawing/2010/main" xmlns="" w="9525">
                   <a:solidFill>
                     <a:srgbClr val="000000"/>
                   </a:solidFill>
@@ -4160,7 +4160,7 @@
             </a:ln>
             <a:extLst>
               <a:ext uri="{91240B29-F687-4f45-9708-019B960494DF}">
-                <a14:hiddenLine xmlns="" xmlns:a14="http://schemas.microsoft.com/office/drawing/2010/main" w="9525">
+                <a14:hiddenLine xmlns:a14="http://schemas.microsoft.com/office/drawing/2010/main" xmlns="" w="9525">
                   <a:solidFill>
                     <a:srgbClr val="000000"/>
                   </a:solidFill>
@@ -4225,7 +4225,7 @@
             </a:ln>
             <a:extLst>
               <a:ext uri="{91240B29-F687-4f45-9708-019B960494DF}">
-                <a14:hiddenLine xmlns="" xmlns:a14="http://schemas.microsoft.com/office/drawing/2010/main" w="9525">
+                <a14:hiddenLine xmlns:a14="http://schemas.microsoft.com/office/drawing/2010/main" xmlns="" w="9525">
                   <a:solidFill>
                     <a:srgbClr val="000000"/>
                   </a:solidFill>
@@ -4287,7 +4287,7 @@
             </a:ln>
             <a:extLst>
               <a:ext uri="{91240B29-F687-4f45-9708-019B960494DF}">
-                <a14:hiddenLine xmlns="" xmlns:a14="http://schemas.microsoft.com/office/drawing/2010/main" w="9525">
+                <a14:hiddenLine xmlns:a14="http://schemas.microsoft.com/office/drawing/2010/main" xmlns="" w="9525">
                   <a:solidFill>
                     <a:srgbClr val="000000"/>
                   </a:solidFill>
@@ -4377,7 +4377,7 @@
             </a:ln>
             <a:extLst>
               <a:ext uri="{91240B29-F687-4f45-9708-019B960494DF}">
-                <a14:hiddenLine xmlns="" xmlns:a14="http://schemas.microsoft.com/office/drawing/2010/main" w="9525">
+                <a14:hiddenLine xmlns:a14="http://schemas.microsoft.com/office/drawing/2010/main" xmlns="" w="9525">
                   <a:solidFill>
                     <a:srgbClr val="000000"/>
                   </a:solidFill>
@@ -4467,7 +4467,7 @@
             </a:ln>
             <a:extLst>
               <a:ext uri="{91240B29-F687-4f45-9708-019B960494DF}">
-                <a14:hiddenLine xmlns="" xmlns:a14="http://schemas.microsoft.com/office/drawing/2010/main" w="9525">
+                <a14:hiddenLine xmlns:a14="http://schemas.microsoft.com/office/drawing/2010/main" xmlns="" w="9525">
                   <a:solidFill>
                     <a:srgbClr val="000000"/>
                   </a:solidFill>
@@ -4529,7 +4529,7 @@
             </a:ln>
             <a:extLst>
               <a:ext uri="{91240B29-F687-4f45-9708-019B960494DF}">
-                <a14:hiddenLine xmlns="" xmlns:a14="http://schemas.microsoft.com/office/drawing/2010/main" w="9525">
+                <a14:hiddenLine xmlns:a14="http://schemas.microsoft.com/office/drawing/2010/main" xmlns="" w="9525">
                   <a:solidFill>
                     <a:srgbClr val="000000"/>
                   </a:solidFill>
@@ -4649,7 +4649,7 @@
             </a:ln>
             <a:extLst>
               <a:ext uri="{91240B29-F687-4f45-9708-019B960494DF}">
-                <a14:hiddenLine xmlns="" xmlns:a14="http://schemas.microsoft.com/office/drawing/2010/main" w="9525">
+                <a14:hiddenLine xmlns:a14="http://schemas.microsoft.com/office/drawing/2010/main" xmlns="" w="9525">
                   <a:solidFill>
                     <a:srgbClr val="000000"/>
                   </a:solidFill>
@@ -4717,7 +4717,7 @@
             </a:ln>
             <a:extLst>
               <a:ext uri="{91240B29-F687-4f45-9708-019B960494DF}">
-                <a14:hiddenLine xmlns="" xmlns:a14="http://schemas.microsoft.com/office/drawing/2010/main" w="9525">
+                <a14:hiddenLine xmlns:a14="http://schemas.microsoft.com/office/drawing/2010/main" xmlns="" w="9525">
                   <a:solidFill>
                     <a:srgbClr val="000000"/>
                   </a:solidFill>
@@ -4807,7 +4807,7 @@
             </a:ln>
             <a:extLst>
               <a:ext uri="{91240B29-F687-4f45-9708-019B960494DF}">
-                <a14:hiddenLine xmlns="" xmlns:a14="http://schemas.microsoft.com/office/drawing/2010/main" w="9525">
+                <a14:hiddenLine xmlns:a14="http://schemas.microsoft.com/office/drawing/2010/main" xmlns="" w="9525">
                   <a:solidFill>
                     <a:srgbClr val="000000"/>
                   </a:solidFill>
@@ -9621,7 +9621,7 @@
           <a:noFill/>
           <a:extLst>
             <a:ext uri="{909E8E84-426E-40dd-AFC4-6F175D3DCCD1}">
-              <a14:hiddenFill xmlns="" xmlns:a14="http://schemas.microsoft.com/office/drawing/2010/main">
+              <a14:hiddenFill xmlns:a14="http://schemas.microsoft.com/office/drawing/2010/main" xmlns="">
                 <a:solidFill>
                   <a:srgbClr val="FFFFFF"/>
                 </a:solidFill>
@@ -9695,7 +9695,7 @@
               </a:ln>
               <a:extLst>
                 <a:ext uri="{91240B29-F687-4f45-9708-019B960494DF}">
-                  <a14:hiddenLine xmlns="" xmlns:a14="http://schemas.microsoft.com/office/drawing/2010/main" w="9525">
+                  <a14:hiddenLine xmlns:a14="http://schemas.microsoft.com/office/drawing/2010/main" xmlns="" w="9525">
                     <a:solidFill>
                       <a:srgbClr val="000000"/>
                     </a:solidFill>
@@ -9785,7 +9785,7 @@
               </a:ln>
               <a:extLst>
                 <a:ext uri="{91240B29-F687-4f45-9708-019B960494DF}">
-                  <a14:hiddenLine xmlns="" xmlns:a14="http://schemas.microsoft.com/office/drawing/2010/main" w="9525">
+                  <a14:hiddenLine xmlns:a14="http://schemas.microsoft.com/office/drawing/2010/main" xmlns="" w="9525">
                     <a:solidFill>
                       <a:srgbClr val="000000"/>
                     </a:solidFill>
@@ -9875,7 +9875,7 @@
               </a:ln>
               <a:extLst>
                 <a:ext uri="{91240B29-F687-4f45-9708-019B960494DF}">
-                  <a14:hiddenLine xmlns="" xmlns:a14="http://schemas.microsoft.com/office/drawing/2010/main" w="9525">
+                  <a14:hiddenLine xmlns:a14="http://schemas.microsoft.com/office/drawing/2010/main" xmlns="" w="9525">
                     <a:solidFill>
                       <a:srgbClr val="000000"/>
                     </a:solidFill>
@@ -9937,7 +9937,7 @@
               </a:ln>
               <a:extLst>
                 <a:ext uri="{91240B29-F687-4f45-9708-019B960494DF}">
-                  <a14:hiddenLine xmlns="" xmlns:a14="http://schemas.microsoft.com/office/drawing/2010/main" w="9525">
+                  <a14:hiddenLine xmlns:a14="http://schemas.microsoft.com/office/drawing/2010/main" xmlns="" w="9525">
                     <a:solidFill>
                       <a:srgbClr val="000000"/>
                     </a:solidFill>
@@ -10027,7 +10027,7 @@
               </a:ln>
               <a:extLst>
                 <a:ext uri="{91240B29-F687-4f45-9708-019B960494DF}">
-                  <a14:hiddenLine xmlns="" xmlns:a14="http://schemas.microsoft.com/office/drawing/2010/main" w="9525">
+                  <a14:hiddenLine xmlns:a14="http://schemas.microsoft.com/office/drawing/2010/main" xmlns="" w="9525">
                     <a:solidFill>
                       <a:srgbClr val="000000"/>
                     </a:solidFill>
@@ -10089,7 +10089,7 @@
               </a:ln>
               <a:extLst>
                 <a:ext uri="{91240B29-F687-4f45-9708-019B960494DF}">
-                  <a14:hiddenLine xmlns="" xmlns:a14="http://schemas.microsoft.com/office/drawing/2010/main" w="9525">
+                  <a14:hiddenLine xmlns:a14="http://schemas.microsoft.com/office/drawing/2010/main" xmlns="" w="9525">
                     <a:solidFill>
                       <a:srgbClr val="000000"/>
                     </a:solidFill>
@@ -10151,7 +10151,7 @@
               </a:ln>
               <a:extLst>
                 <a:ext uri="{91240B29-F687-4f45-9708-019B960494DF}">
-                  <a14:hiddenLine xmlns="" xmlns:a14="http://schemas.microsoft.com/office/drawing/2010/main" w="9525">
+                  <a14:hiddenLine xmlns:a14="http://schemas.microsoft.com/office/drawing/2010/main" xmlns="" w="9525">
                     <a:solidFill>
                       <a:srgbClr val="000000"/>
                     </a:solidFill>
@@ -10241,7 +10241,7 @@
               </a:ln>
               <a:extLst>
                 <a:ext uri="{91240B29-F687-4f45-9708-019B960494DF}">
-                  <a14:hiddenLine xmlns="" xmlns:a14="http://schemas.microsoft.com/office/drawing/2010/main" w="9525">
+                  <a14:hiddenLine xmlns:a14="http://schemas.microsoft.com/office/drawing/2010/main" xmlns="" w="9525">
                     <a:solidFill>
                       <a:srgbClr val="000000"/>
                     </a:solidFill>
@@ -10331,7 +10331,7 @@
               </a:ln>
               <a:extLst>
                 <a:ext uri="{91240B29-F687-4f45-9708-019B960494DF}">
-                  <a14:hiddenLine xmlns="" xmlns:a14="http://schemas.microsoft.com/office/drawing/2010/main" w="9525">
+                  <a14:hiddenLine xmlns:a14="http://schemas.microsoft.com/office/drawing/2010/main" xmlns="" w="9525">
                     <a:solidFill>
                       <a:srgbClr val="000000"/>
                     </a:solidFill>
@@ -10393,7 +10393,7 @@
               </a:ln>
               <a:extLst>
                 <a:ext uri="{91240B29-F687-4f45-9708-019B960494DF}">
-                  <a14:hiddenLine xmlns="" xmlns:a14="http://schemas.microsoft.com/office/drawing/2010/main" w="9525">
+                  <a14:hiddenLine xmlns:a14="http://schemas.microsoft.com/office/drawing/2010/main" xmlns="" w="9525">
                     <a:solidFill>
                       <a:srgbClr val="000000"/>
                     </a:solidFill>
@@ -10503,7 +10503,7 @@
               </a:ln>
               <a:extLst>
                 <a:ext uri="{91240B29-F687-4f45-9708-019B960494DF}">
-                  <a14:hiddenLine xmlns="" xmlns:a14="http://schemas.microsoft.com/office/drawing/2010/main" w="9525">
+                  <a14:hiddenLine xmlns:a14="http://schemas.microsoft.com/office/drawing/2010/main" xmlns="" w="9525">
                     <a:solidFill>
                       <a:srgbClr val="000000"/>
                     </a:solidFill>
@@ -10587,7 +10587,7 @@
               </a:ln>
               <a:extLst>
                 <a:ext uri="{91240B29-F687-4f45-9708-019B960494DF}">
-                  <a14:hiddenLine xmlns="" xmlns:a14="http://schemas.microsoft.com/office/drawing/2010/main" w="9525">
+                  <a14:hiddenLine xmlns:a14="http://schemas.microsoft.com/office/drawing/2010/main" xmlns="" w="9525">
                     <a:solidFill>
                       <a:srgbClr val="000000"/>
                     </a:solidFill>
@@ -10649,7 +10649,7 @@
               </a:ln>
               <a:extLst>
                 <a:ext uri="{91240B29-F687-4f45-9708-019B960494DF}">
-                  <a14:hiddenLine xmlns="" xmlns:a14="http://schemas.microsoft.com/office/drawing/2010/main" w="9525">
+                  <a14:hiddenLine xmlns:a14="http://schemas.microsoft.com/office/drawing/2010/main" xmlns="" w="9525">
                     <a:solidFill>
                       <a:srgbClr val="000000"/>
                     </a:solidFill>
@@ -10711,7 +10711,7 @@
               </a:ln>
               <a:extLst>
                 <a:ext uri="{91240B29-F687-4f45-9708-019B960494DF}">
-                  <a14:hiddenLine xmlns="" xmlns:a14="http://schemas.microsoft.com/office/drawing/2010/main" w="9525">
+                  <a14:hiddenLine xmlns:a14="http://schemas.microsoft.com/office/drawing/2010/main" xmlns="" w="9525">
                     <a:solidFill>
                       <a:srgbClr val="000000"/>
                     </a:solidFill>
@@ -10801,7 +10801,7 @@
               </a:ln>
               <a:extLst>
                 <a:ext uri="{91240B29-F687-4f45-9708-019B960494DF}">
-                  <a14:hiddenLine xmlns="" xmlns:a14="http://schemas.microsoft.com/office/drawing/2010/main" w="9525">
+                  <a14:hiddenLine xmlns:a14="http://schemas.microsoft.com/office/drawing/2010/main" xmlns="" w="9525">
                     <a:solidFill>
                       <a:srgbClr val="000000"/>
                     </a:solidFill>
@@ -10835,7 +10835,7 @@
               </a:ln>
               <a:extLst>
                 <a:ext uri="{91240B29-F687-4f45-9708-019B960494DF}">
-                  <a14:hiddenLine xmlns="" xmlns:a14="http://schemas.microsoft.com/office/drawing/2010/main" w="9525">
+                  <a14:hiddenLine xmlns:a14="http://schemas.microsoft.com/office/drawing/2010/main" xmlns="" w="9525">
                     <a:solidFill>
                       <a:srgbClr val="000000"/>
                     </a:solidFill>
@@ -10900,7 +10900,7 @@
               </a:ln>
               <a:extLst>
                 <a:ext uri="{91240B29-F687-4f45-9708-019B960494DF}">
-                  <a14:hiddenLine xmlns="" xmlns:a14="http://schemas.microsoft.com/office/drawing/2010/main" w="9525">
+                  <a14:hiddenLine xmlns:a14="http://schemas.microsoft.com/office/drawing/2010/main" xmlns="" w="9525">
                     <a:solidFill>
                       <a:srgbClr val="000000"/>
                     </a:solidFill>
@@ -10990,7 +10990,7 @@
               </a:ln>
               <a:extLst>
                 <a:ext uri="{91240B29-F687-4f45-9708-019B960494DF}">
-                  <a14:hiddenLine xmlns="" xmlns:a14="http://schemas.microsoft.com/office/drawing/2010/main" w="9525">
+                  <a14:hiddenLine xmlns:a14="http://schemas.microsoft.com/office/drawing/2010/main" xmlns="" w="9525">
                     <a:solidFill>
                       <a:srgbClr val="000000"/>
                     </a:solidFill>
@@ -11052,7 +11052,7 @@
               </a:ln>
               <a:extLst>
                 <a:ext uri="{91240B29-F687-4f45-9708-019B960494DF}">
-                  <a14:hiddenLine xmlns="" xmlns:a14="http://schemas.microsoft.com/office/drawing/2010/main" w="9525">
+                  <a14:hiddenLine xmlns:a14="http://schemas.microsoft.com/office/drawing/2010/main" xmlns="" w="9525">
                     <a:solidFill>
                       <a:srgbClr val="000000"/>
                     </a:solidFill>
@@ -11142,7 +11142,7 @@
               </a:ln>
               <a:extLst>
                 <a:ext uri="{91240B29-F687-4f45-9708-019B960494DF}">
-                  <a14:hiddenLine xmlns="" xmlns:a14="http://schemas.microsoft.com/office/drawing/2010/main" w="9525">
+                  <a14:hiddenLine xmlns:a14="http://schemas.microsoft.com/office/drawing/2010/main" xmlns="" w="9525">
                     <a:solidFill>
                       <a:srgbClr val="000000"/>
                     </a:solidFill>
@@ -11207,7 +11207,7 @@
               </a:ln>
               <a:extLst>
                 <a:ext uri="{91240B29-F687-4f45-9708-019B960494DF}">
-                  <a14:hiddenLine xmlns="" xmlns:a14="http://schemas.microsoft.com/office/drawing/2010/main" w="9525">
+                  <a14:hiddenLine xmlns:a14="http://schemas.microsoft.com/office/drawing/2010/main" xmlns="" w="9525">
                     <a:solidFill>
                       <a:srgbClr val="000000"/>
                     </a:solidFill>
@@ -11269,7 +11269,7 @@
               </a:ln>
               <a:extLst>
                 <a:ext uri="{91240B29-F687-4f45-9708-019B960494DF}">
-                  <a14:hiddenLine xmlns="" xmlns:a14="http://schemas.microsoft.com/office/drawing/2010/main" w="9525">
+                  <a14:hiddenLine xmlns:a14="http://schemas.microsoft.com/office/drawing/2010/main" xmlns="" w="9525">
                     <a:solidFill>
                       <a:srgbClr val="000000"/>
                     </a:solidFill>
@@ -11359,7 +11359,7 @@
               </a:ln>
               <a:extLst>
                 <a:ext uri="{91240B29-F687-4f45-9708-019B960494DF}">
-                  <a14:hiddenLine xmlns="" xmlns:a14="http://schemas.microsoft.com/office/drawing/2010/main" w="9525">
+                  <a14:hiddenLine xmlns:a14="http://schemas.microsoft.com/office/drawing/2010/main" xmlns="" w="9525">
                     <a:solidFill>
                       <a:srgbClr val="000000"/>
                     </a:solidFill>
@@ -11449,7 +11449,7 @@
               </a:ln>
               <a:extLst>
                 <a:ext uri="{91240B29-F687-4f45-9708-019B960494DF}">
-                  <a14:hiddenLine xmlns="" xmlns:a14="http://schemas.microsoft.com/office/drawing/2010/main" w="9525">
+                  <a14:hiddenLine xmlns:a14="http://schemas.microsoft.com/office/drawing/2010/main" xmlns="" w="9525">
                     <a:solidFill>
                       <a:srgbClr val="000000"/>
                     </a:solidFill>
@@ -11514,7 +11514,7 @@
               </a:ln>
               <a:extLst>
                 <a:ext uri="{91240B29-F687-4f45-9708-019B960494DF}">
-                  <a14:hiddenLine xmlns="" xmlns:a14="http://schemas.microsoft.com/office/drawing/2010/main" w="9525">
+                  <a14:hiddenLine xmlns:a14="http://schemas.microsoft.com/office/drawing/2010/main" xmlns="" w="9525">
                     <a:solidFill>
                       <a:srgbClr val="000000"/>
                     </a:solidFill>
@@ -11634,7 +11634,7 @@
               </a:ln>
               <a:extLst>
                 <a:ext uri="{91240B29-F687-4f45-9708-019B960494DF}">
-                  <a14:hiddenLine xmlns="" xmlns:a14="http://schemas.microsoft.com/office/drawing/2010/main" w="9525">
+                  <a14:hiddenLine xmlns:a14="http://schemas.microsoft.com/office/drawing/2010/main" xmlns="" w="9525">
                     <a:solidFill>
                       <a:srgbClr val="000000"/>
                     </a:solidFill>
@@ -11715,7 +11715,7 @@
               </a:ln>
               <a:extLst>
                 <a:ext uri="{91240B29-F687-4f45-9708-019B960494DF}">
-                  <a14:hiddenLine xmlns="" xmlns:a14="http://schemas.microsoft.com/office/drawing/2010/main" w="9525">
+                  <a14:hiddenLine xmlns:a14="http://schemas.microsoft.com/office/drawing/2010/main" xmlns="" w="9525">
                     <a:solidFill>
                       <a:srgbClr val="000000"/>
                     </a:solidFill>
@@ -11830,7 +11830,7 @@
               </a:ln>
               <a:extLst>
                 <a:ext uri="{91240B29-F687-4f45-9708-019B960494DF}">
-                  <a14:hiddenLine xmlns="" xmlns:a14="http://schemas.microsoft.com/office/drawing/2010/main" w="9525">
+                  <a14:hiddenLine xmlns:a14="http://schemas.microsoft.com/office/drawing/2010/main" xmlns="" w="9525">
                     <a:solidFill>
                       <a:srgbClr val="000000"/>
                     </a:solidFill>
@@ -11920,7 +11920,7 @@
               </a:ln>
               <a:extLst>
                 <a:ext uri="{91240B29-F687-4f45-9708-019B960494DF}">
-                  <a14:hiddenLine xmlns="" xmlns:a14="http://schemas.microsoft.com/office/drawing/2010/main" w="9525">
+                  <a14:hiddenLine xmlns:a14="http://schemas.microsoft.com/office/drawing/2010/main" xmlns="" w="9525">
                     <a:solidFill>
                       <a:srgbClr val="000000"/>
                     </a:solidFill>
@@ -11985,7 +11985,7 @@
               </a:ln>
               <a:extLst>
                 <a:ext uri="{91240B29-F687-4f45-9708-019B960494DF}">
-                  <a14:hiddenLine xmlns="" xmlns:a14="http://schemas.microsoft.com/office/drawing/2010/main" w="9525">
+                  <a14:hiddenLine xmlns:a14="http://schemas.microsoft.com/office/drawing/2010/main" xmlns="" w="9525">
                     <a:solidFill>
                       <a:srgbClr val="000000"/>
                     </a:solidFill>
@@ -12075,7 +12075,7 @@
               </a:ln>
               <a:extLst>
                 <a:ext uri="{91240B29-F687-4f45-9708-019B960494DF}">
-                  <a14:hiddenLine xmlns="" xmlns:a14="http://schemas.microsoft.com/office/drawing/2010/main" w="9525">
+                  <a14:hiddenLine xmlns:a14="http://schemas.microsoft.com/office/drawing/2010/main" xmlns="" w="9525">
                     <a:solidFill>
                       <a:srgbClr val="000000"/>
                     </a:solidFill>
@@ -12143,7 +12143,7 @@
               </a:ln>
               <a:extLst>
                 <a:ext uri="{91240B29-F687-4f45-9708-019B960494DF}">
-                  <a14:hiddenLine xmlns="" xmlns:a14="http://schemas.microsoft.com/office/drawing/2010/main" w="9525">
+                  <a14:hiddenLine xmlns:a14="http://schemas.microsoft.com/office/drawing/2010/main" xmlns="" w="9525">
                     <a:solidFill>
                       <a:srgbClr val="000000"/>
                     </a:solidFill>
@@ -12233,7 +12233,7 @@
               </a:ln>
               <a:extLst>
                 <a:ext uri="{91240B29-F687-4f45-9708-019B960494DF}">
-                  <a14:hiddenLine xmlns="" xmlns:a14="http://schemas.microsoft.com/office/drawing/2010/main" w="9525">
+                  <a14:hiddenLine xmlns:a14="http://schemas.microsoft.com/office/drawing/2010/main" xmlns="" w="9525">
                     <a:solidFill>
                       <a:srgbClr val="000000"/>
                     </a:solidFill>
@@ -12301,7 +12301,7 @@
               </a:ln>
               <a:extLst>
                 <a:ext uri="{91240B29-F687-4f45-9708-019B960494DF}">
-                  <a14:hiddenLine xmlns="" xmlns:a14="http://schemas.microsoft.com/office/drawing/2010/main" w="9525">
+                  <a14:hiddenLine xmlns:a14="http://schemas.microsoft.com/office/drawing/2010/main" xmlns="" w="9525">
                     <a:solidFill>
                       <a:srgbClr val="000000"/>
                     </a:solidFill>
@@ -12391,7 +12391,7 @@
               </a:ln>
               <a:extLst>
                 <a:ext uri="{91240B29-F687-4f45-9708-019B960494DF}">
-                  <a14:hiddenLine xmlns="" xmlns:a14="http://schemas.microsoft.com/office/drawing/2010/main" w="9525">
+                  <a14:hiddenLine xmlns:a14="http://schemas.microsoft.com/office/drawing/2010/main" xmlns="" w="9525">
                     <a:solidFill>
                       <a:srgbClr val="000000"/>
                     </a:solidFill>
@@ -12425,7 +12425,7 @@
               </a:ln>
               <a:extLst>
                 <a:ext uri="{91240B29-F687-4f45-9708-019B960494DF}">
-                  <a14:hiddenLine xmlns="" xmlns:a14="http://schemas.microsoft.com/office/drawing/2010/main" w="9525">
+                  <a14:hiddenLine xmlns:a14="http://schemas.microsoft.com/office/drawing/2010/main" xmlns="" w="9525">
                     <a:solidFill>
                       <a:srgbClr val="000000"/>
                     </a:solidFill>
@@ -13039,7 +13039,7 @@
         <p:spPr/>
         <p:txBody>
           <a:bodyPr>
-            <a:normAutofit fontScale="85000" lnSpcReduction="10000"/>
+            <a:normAutofit fontScale="70000" lnSpcReduction="20000"/>
           </a:bodyPr>
           <a:lstStyle/>
           <a:p>
@@ -13052,6 +13052,22 @@
               </a:rPr>
               <a:t>By Gavin Gunawardena</a:t>
             </a:r>
+          </a:p>
+          <a:p>
+            <a:pPr algn="ctr"/>
+            <a:r>
+              <a:rPr lang="en-US" sz="2400">
+                <a:latin typeface="Tahoma" panose="020B0604030504040204" pitchFamily="34" charset="0"/>
+                <a:ea typeface="Tahoma" panose="020B0604030504040204" pitchFamily="34" charset="0"/>
+                <a:cs typeface="Tahoma" panose="020B0604030504040204" pitchFamily="34" charset="0"/>
+              </a:rPr>
+              <a:t>2/20/2023</a:t>
+            </a:r>
+            <a:endParaRPr lang="en-US" sz="2400" dirty="0">
+              <a:latin typeface="Tahoma" panose="020B0604030504040204" pitchFamily="34" charset="0"/>
+              <a:ea typeface="Tahoma" panose="020B0604030504040204" pitchFamily="34" charset="0"/>
+              <a:cs typeface="Tahoma" panose="020B0604030504040204" pitchFamily="34" charset="0"/>
+            </a:endParaRPr>
           </a:p>
           <a:p>
             <a:pPr algn="ctr"/>
@@ -14915,23 +14931,6 @@
 </file>
 
 <file path=customXml/item1.xml><?xml version="1.0" encoding="utf-8"?>
-<p:properties xmlns:p="http://schemas.microsoft.com/office/2006/metadata/properties" xmlns:xsi="http://www.w3.org/2001/XMLSchema-instance" xmlns:pc="http://schemas.microsoft.com/office/infopath/2007/PartnerControls">
-  <documentManagement>
-    <MediaServiceKeyPoints xmlns="71af3243-3dd4-4a8d-8c0d-dd76da1f02a5" xsi:nil="true"/>
-  </documentManagement>
-</p:properties>
-</file>
-
-<file path=customXml/item2.xml><?xml version="1.0" encoding="utf-8"?>
-<?mso-contentType ?>
-<FormTemplates xmlns="http://schemas.microsoft.com/sharepoint/v3/contenttype/forms">
-  <Display>DocumentLibraryForm</Display>
-  <Edit>DocumentLibraryForm</Edit>
-  <New>DocumentLibraryForm</New>
-</FormTemplates>
-</file>
-
-<file path=customXml/item3.xml><?xml version="1.0" encoding="utf-8"?>
 <ct:contentTypeSchema xmlns:ct="http://schemas.microsoft.com/office/2006/metadata/contentType" xmlns:ma="http://schemas.microsoft.com/office/2006/metadata/properties/metaAttributes" ct:_="" ma:_="" ma:contentTypeName="Document" ma:contentTypeID="0x01010079F111ED35F8CC479449609E8A0923A6" ma:contentTypeVersion="11" ma:contentTypeDescription="Create a new document." ma:contentTypeScope="" ma:versionID="96291512c1ee715ab617f4c07df79fc1">
   <xsd:schema xmlns:xsd="http://www.w3.org/2001/XMLSchema" xmlns:xs="http://www.w3.org/2001/XMLSchema" xmlns:p="http://schemas.microsoft.com/office/2006/metadata/properties" xmlns:ns2="71af3243-3dd4-4a8d-8c0d-dd76da1f02a5" xmlns:ns3="16c05727-aa75-4e4a-9b5f-8a80a1165891" targetNamespace="http://schemas.microsoft.com/office/2006/metadata/properties" ma:root="true" ma:fieldsID="8256c27c40ca5c40ce1cf6c44f0205df" ns2:_="" ns3:_="">
     <xsd:import namespace="71af3243-3dd4-4a8d-8c0d-dd76da1f02a5"/>
@@ -15142,32 +15141,24 @@
 </ct:contentTypeSchema>
 </file>
 
-<file path=customXml/itemProps1.xml><?xml version="1.0" encoding="utf-8"?>
-<ds:datastoreItem xmlns:ds="http://schemas.openxmlformats.org/officeDocument/2006/customXml" ds:itemID="{E7866CFD-F94E-4AE5-ACEA-86FEC0F48A10}">
-  <ds:schemaRefs>
-    <ds:schemaRef ds:uri="http://schemas.microsoft.com/office/2006/documentManagement/types"/>
-    <ds:schemaRef ds:uri="71af3243-3dd4-4a8d-8c0d-dd76da1f02a5"/>
-    <ds:schemaRef ds:uri="http://schemas.microsoft.com/office/infopath/2007/PartnerControls"/>
-    <ds:schemaRef ds:uri="http://purl.org/dc/terms/"/>
-    <ds:schemaRef ds:uri="http://www.w3.org/XML/1998/namespace"/>
-    <ds:schemaRef ds:uri="http://schemas.openxmlformats.org/package/2006/metadata/core-properties"/>
-    <ds:schemaRef ds:uri="http://purl.org/dc/elements/1.1/"/>
-    <ds:schemaRef ds:uri="16c05727-aa75-4e4a-9b5f-8a80a1165891"/>
-    <ds:schemaRef ds:uri="http://schemas.microsoft.com/office/2006/metadata/properties"/>
-    <ds:schemaRef ds:uri="http://purl.org/dc/dcmitype/"/>
-  </ds:schemaRefs>
-</ds:datastoreItem>
+<file path=customXml/item2.xml><?xml version="1.0" encoding="utf-8"?>
+<?mso-contentType ?>
+<FormTemplates xmlns="http://schemas.microsoft.com/sharepoint/v3/contenttype/forms">
+  <Display>DocumentLibraryForm</Display>
+  <Edit>DocumentLibraryForm</Edit>
+  <New>DocumentLibraryForm</New>
+</FormTemplates>
 </file>
 
-<file path=customXml/itemProps2.xml><?xml version="1.0" encoding="utf-8"?>
-<ds:datastoreItem xmlns:ds="http://schemas.openxmlformats.org/officeDocument/2006/customXml" ds:itemID="{B579702B-25C7-40D7-9E29-7686B11A9660}">
-  <ds:schemaRefs>
-    <ds:schemaRef ds:uri="http://schemas.microsoft.com/sharepoint/v3/contenttype/forms"/>
-  </ds:schemaRefs>
-</ds:datastoreItem>
+<file path=customXml/item3.xml><?xml version="1.0" encoding="utf-8"?>
+<p:properties xmlns:p="http://schemas.microsoft.com/office/2006/metadata/properties" xmlns:xsi="http://www.w3.org/2001/XMLSchema-instance" xmlns:pc="http://schemas.microsoft.com/office/infopath/2007/PartnerControls">
+  <documentManagement>
+    <MediaServiceKeyPoints xmlns="71af3243-3dd4-4a8d-8c0d-dd76da1f02a5" xsi:nil="true"/>
+  </documentManagement>
+</p:properties>
 </file>
 
-<file path=customXml/itemProps3.xml><?xml version="1.0" encoding="utf-8"?>
+<file path=customXml/itemProps1.xml><?xml version="1.0" encoding="utf-8"?>
 <ds:datastoreItem xmlns:ds="http://schemas.openxmlformats.org/officeDocument/2006/customXml" ds:itemID="{A7C0B241-13E5-418D-8920-D23491E2D2C0}">
   <ds:schemaRefs>
     <ds:schemaRef ds:uri="http://schemas.microsoft.com/office/2006/metadata/contentType"/>
@@ -15184,4 +15175,29 @@
     <ds:schemaRef ds:uri="http://schemas.microsoft.com/internal/obd"/>
   </ds:schemaRefs>
 </ds:datastoreItem>
+</file>
+
+<file path=customXml/itemProps2.xml><?xml version="1.0" encoding="utf-8"?>
+<ds:datastoreItem xmlns:ds="http://schemas.openxmlformats.org/officeDocument/2006/customXml" ds:itemID="{B579702B-25C7-40D7-9E29-7686B11A9660}">
+  <ds:schemaRefs>
+    <ds:schemaRef ds:uri="http://schemas.microsoft.com/sharepoint/v3/contenttype/forms"/>
+  </ds:schemaRefs>
+</ds:datastoreItem>
+</file>
+
+<file path=customXml/itemProps3.xml><?xml version="1.0" encoding="utf-8"?>
+<ds:datastoreItem xmlns:ds="http://schemas.openxmlformats.org/officeDocument/2006/customXml" ds:itemID="{E7866CFD-F94E-4AE5-ACEA-86FEC0F48A10}">
+  <ds:schemaRefs>
+    <ds:schemaRef ds:uri="http://schemas.microsoft.com/office/2006/documentManagement/types"/>
+    <ds:schemaRef ds:uri="71af3243-3dd4-4a8d-8c0d-dd76da1f02a5"/>
+    <ds:schemaRef ds:uri="http://schemas.microsoft.com/office/infopath/2007/PartnerControls"/>
+    <ds:schemaRef ds:uri="http://purl.org/dc/terms/"/>
+    <ds:schemaRef ds:uri="http://www.w3.org/XML/1998/namespace"/>
+    <ds:schemaRef ds:uri="http://schemas.openxmlformats.org/package/2006/metadata/core-properties"/>
+    <ds:schemaRef ds:uri="http://purl.org/dc/elements/1.1/"/>
+    <ds:schemaRef ds:uri="16c05727-aa75-4e4a-9b5f-8a80a1165891"/>
+    <ds:schemaRef ds:uri="http://schemas.microsoft.com/office/2006/metadata/properties"/>
+    <ds:schemaRef ds:uri="http://purl.org/dc/dcmitype/"/>
+  </ds:schemaRefs>
+</ds:datastoreItem>
 </file>
</xml_diff>